<commit_message>
Reverted naming in architecture figure
As per discussion during the 12/12/2022 meeting
</commit_message>
<xml_diff>
--- a/figs/flex-routing-arch.pptx
+++ b/figs/flex-routing-arch.pptx
@@ -198,7 +198,7 @@
           <a:p>
             <a:fld id="{ECF82043-8352-41EB-BE85-264C2E5BC992}" type="datetimeFigureOut">
               <a:rPr lang="en-GB" smtClean="0"/>
-              <a:t>11/12/2022</a:t>
+              <a:t>13/12/2022</a:t>
             </a:fld>
             <a:endParaRPr lang="en-GB"/>
           </a:p>
@@ -613,7 +613,7 @@
           <a:p>
             <a:fld id="{B72825D7-6CAC-4DD9-81D1-F420B7F343C3}" type="datetimeFigureOut">
               <a:rPr lang="en-US" smtClean="0"/>
-              <a:t>12/11/2022</a:t>
+              <a:t>12/13/2022</a:t>
             </a:fld>
             <a:endParaRPr lang="en-US"/>
           </a:p>
@@ -811,7 +811,7 @@
           <a:p>
             <a:fld id="{B72825D7-6CAC-4DD9-81D1-F420B7F343C3}" type="datetimeFigureOut">
               <a:rPr lang="en-US" smtClean="0"/>
-              <a:t>12/11/2022</a:t>
+              <a:t>12/13/2022</a:t>
             </a:fld>
             <a:endParaRPr lang="en-US"/>
           </a:p>
@@ -1019,7 +1019,7 @@
           <a:p>
             <a:fld id="{B72825D7-6CAC-4DD9-81D1-F420B7F343C3}" type="datetimeFigureOut">
               <a:rPr lang="en-US" smtClean="0"/>
-              <a:t>12/11/2022</a:t>
+              <a:t>12/13/2022</a:t>
             </a:fld>
             <a:endParaRPr lang="en-US"/>
           </a:p>
@@ -2904,7 +2904,7 @@
           <a:p>
             <a:fld id="{B72825D7-6CAC-4DD9-81D1-F420B7F343C3}" type="datetimeFigureOut">
               <a:rPr lang="en-US" smtClean="0"/>
-              <a:t>12/11/2022</a:t>
+              <a:t>12/13/2022</a:t>
             </a:fld>
             <a:endParaRPr lang="en-US"/>
           </a:p>
@@ -11482,7 +11482,7 @@
           <a:p>
             <a:fld id="{B72825D7-6CAC-4DD9-81D1-F420B7F343C3}" type="datetimeFigureOut">
               <a:rPr lang="en-US" smtClean="0"/>
-              <a:t>12/11/2022</a:t>
+              <a:t>12/13/2022</a:t>
             </a:fld>
             <a:endParaRPr lang="en-US"/>
           </a:p>
@@ -15607,7 +15607,7 @@
           <a:p>
             <a:fld id="{B72825D7-6CAC-4DD9-81D1-F420B7F343C3}" type="datetimeFigureOut">
               <a:rPr lang="en-US" smtClean="0"/>
-              <a:t>12/11/2022</a:t>
+              <a:t>12/13/2022</a:t>
             </a:fld>
             <a:endParaRPr lang="en-US"/>
           </a:p>
@@ -16019,7 +16019,7 @@
           <a:p>
             <a:fld id="{B72825D7-6CAC-4DD9-81D1-F420B7F343C3}" type="datetimeFigureOut">
               <a:rPr lang="en-US" smtClean="0"/>
-              <a:t>12/11/2022</a:t>
+              <a:t>12/13/2022</a:t>
             </a:fld>
             <a:endParaRPr lang="en-US"/>
           </a:p>
@@ -16160,7 +16160,7 @@
           <a:p>
             <a:fld id="{B72825D7-6CAC-4DD9-81D1-F420B7F343C3}" type="datetimeFigureOut">
               <a:rPr lang="en-US" smtClean="0"/>
-              <a:t>12/11/2022</a:t>
+              <a:t>12/13/2022</a:t>
             </a:fld>
             <a:endParaRPr lang="en-US"/>
           </a:p>
@@ -16273,7 +16273,7 @@
           <a:p>
             <a:fld id="{B72825D7-6CAC-4DD9-81D1-F420B7F343C3}" type="datetimeFigureOut">
               <a:rPr lang="en-US" smtClean="0"/>
-              <a:t>12/11/2022</a:t>
+              <a:t>12/13/2022</a:t>
             </a:fld>
             <a:endParaRPr lang="en-US"/>
           </a:p>
@@ -16584,7 +16584,7 @@
           <a:p>
             <a:fld id="{B72825D7-6CAC-4DD9-81D1-F420B7F343C3}" type="datetimeFigureOut">
               <a:rPr lang="en-US" smtClean="0"/>
-              <a:t>12/11/2022</a:t>
+              <a:t>12/13/2022</a:t>
             </a:fld>
             <a:endParaRPr lang="en-US"/>
           </a:p>
@@ -16872,7 +16872,7 @@
           <a:p>
             <a:fld id="{B72825D7-6CAC-4DD9-81D1-F420B7F343C3}" type="datetimeFigureOut">
               <a:rPr lang="en-US" smtClean="0"/>
-              <a:t>12/11/2022</a:t>
+              <a:t>12/13/2022</a:t>
             </a:fld>
             <a:endParaRPr lang="en-US"/>
           </a:p>
@@ -17113,7 +17113,7 @@
           <a:p>
             <a:fld id="{B72825D7-6CAC-4DD9-81D1-F420B7F343C3}" type="datetimeFigureOut">
               <a:rPr lang="en-US" smtClean="0"/>
-              <a:t>12/11/2022</a:t>
+              <a:t>12/13/2022</a:t>
             </a:fld>
             <a:endParaRPr lang="en-US"/>
           </a:p>
@@ -21203,9 +21203,10 @@
           <a:p>
             <a:pPr algn="ctr"/>
             <a:r>
-              <a:rPr lang="en-US" dirty="0"/>
-              <a:t>Control</a:t>
-            </a:r>
+              <a:rPr lang="en-US" dirty="0" err="1"/>
+              <a:t>MainControl</a:t>
+            </a:r>
+            <a:endParaRPr lang="en-US" dirty="0"/>
           </a:p>
         </p:txBody>
       </p:sp>
@@ -21255,8 +21256,8 @@
           <a:p>
             <a:pPr algn="ctr"/>
             <a:r>
-              <a:rPr lang="en-US" dirty="0" err="1"/>
-              <a:t>Deparser</a:t>
+              <a:rPr lang="en-US"/>
+              <a:t>MainDeparser</a:t>
             </a:r>
             <a:endParaRPr lang="en-US" dirty="0"/>
           </a:p>
@@ -21429,9 +21430,10 @@
           <a:p>
             <a:pPr algn="ctr"/>
             <a:r>
-              <a:rPr lang="en-US" dirty="0"/>
-              <a:t>Parser</a:t>
-            </a:r>
+              <a:rPr lang="en-US" dirty="0" err="1"/>
+              <a:t>MainParser</a:t>
+            </a:r>
+            <a:endParaRPr lang="en-US" dirty="0"/>
           </a:p>
         </p:txBody>
       </p:sp>
@@ -22682,6 +22684,14 @@
 </file>
 
 <file path=customXml/item1.xml><?xml version="1.0" encoding="utf-8"?>
+<TemplafySlideTemplateConfiguration><![CDATA[{"slideVersion":1,"isValidatorEnabled":false,"isLocked":false,"elementsMetadata":[],"slideId":"637629098780944294","enableDocumentContentUpdater":true,"version":"2.0"}]]></TemplafySlideTemplateConfiguration>
+</file>
+
+<file path=customXml/item2.xml><?xml version="1.0" encoding="utf-8"?>
+<TemplafySlideFormConfiguration><![CDATA[{"formFields":[],"formDataEntries":[]}]]></TemplafySlideFormConfiguration>
+</file>
+
+<file path=customXml/item3.xml><?xml version="1.0" encoding="utf-8"?>
 <ct:contentTypeSchema xmlns:ct="http://schemas.microsoft.com/office/2006/metadata/contentType" xmlns:ma="http://schemas.microsoft.com/office/2006/metadata/properties/metaAttributes" ct:_="" ma:_="" ma:contentTypeName="Document" ma:contentTypeID="0x01010074D2001F796B5842ACB4675D256F8FDC" ma:contentTypeVersion="12" ma:contentTypeDescription="Create a new document." ma:contentTypeScope="" ma:versionID="c85e048fa781f40110e66b592c02dbca">
   <xsd:schema xmlns:xsd="http://www.w3.org/2001/XMLSchema" xmlns:xs="http://www.w3.org/2001/XMLSchema" xmlns:p="http://schemas.microsoft.com/office/2006/metadata/properties" xmlns:ns3="88a3e169-3f2e-4cb2-84e3-0f816f3920de" xmlns:ns4="6d44ab1e-4f7a-423e-9215-d8d8e61f56e6" targetNamespace="http://schemas.microsoft.com/office/2006/metadata/properties" ma:root="true" ma:fieldsID="6538c91a1e992d8cfb9fb30155d82126" ns3:_="" ns4:_="">
     <xsd:import namespace="88a3e169-3f2e-4cb2-84e3-0f816f3920de"/>
@@ -22898,15 +22908,13 @@
 </ct:contentTypeSchema>
 </file>
 
-<file path=customXml/item2.xml><?xml version="1.0" encoding="utf-8"?>
-<TemplafySlideFormConfiguration><![CDATA[{"formFields":[],"formDataEntries":[]}]]></TemplafySlideFormConfiguration>
+<file path=customXml/item4.xml><?xml version="1.0" encoding="utf-8"?>
+<p:properties xmlns:p="http://schemas.microsoft.com/office/2006/metadata/properties" xmlns:xsi="http://www.w3.org/2001/XMLSchema-instance" xmlns:pc="http://schemas.microsoft.com/office/infopath/2007/PartnerControls">
+  <documentManagement/>
+</p:properties>
 </file>
 
-<file path=customXml/item3.xml><?xml version="1.0" encoding="utf-8"?>
-<TemplafySlideTemplateConfiguration><![CDATA[{"slideVersion":1,"isValidatorEnabled":false,"isLocked":false,"elementsMetadata":[],"slideId":"637629098780944294","enableDocumentContentUpdater":true,"version":"2.0"}]]></TemplafySlideTemplateConfiguration>
-</file>
-
-<file path=customXml/item4.xml><?xml version="1.0" encoding="utf-8"?>
+<file path=customXml/item5.xml><?xml version="1.0" encoding="utf-8"?>
 <?mso-contentType ?>
 <FormTemplates xmlns="http://schemas.microsoft.com/sharepoint/v3/contenttype/forms">
   <Display>DocumentLibraryForm</Display>
@@ -22915,13 +22923,19 @@
 </FormTemplates>
 </file>
 
-<file path=customXml/item5.xml><?xml version="1.0" encoding="utf-8"?>
-<p:properties xmlns:p="http://schemas.microsoft.com/office/2006/metadata/properties" xmlns:xsi="http://www.w3.org/2001/XMLSchema-instance" xmlns:pc="http://schemas.microsoft.com/office/infopath/2007/PartnerControls">
-  <documentManagement/>
-</p:properties>
+<file path=customXml/itemProps1.xml><?xml version="1.0" encoding="utf-8"?>
+<ds:datastoreItem xmlns:ds="http://schemas.openxmlformats.org/officeDocument/2006/customXml" ds:itemID="{08A7BF88-E750-4836-81D0-A8F6064491C0}">
+  <ds:schemaRefs/>
+</ds:datastoreItem>
 </file>
 
-<file path=customXml/itemProps1.xml><?xml version="1.0" encoding="utf-8"?>
+<file path=customXml/itemProps2.xml><?xml version="1.0" encoding="utf-8"?>
+<ds:datastoreItem xmlns:ds="http://schemas.openxmlformats.org/officeDocument/2006/customXml" ds:itemID="{F3EB3076-2C4C-48B3-A0FA-C6CCF3215BD6}">
+  <ds:schemaRefs/>
+</ds:datastoreItem>
+</file>
+
+<file path=customXml/itemProps3.xml><?xml version="1.0" encoding="utf-8"?>
 <ds:datastoreItem xmlns:ds="http://schemas.openxmlformats.org/officeDocument/2006/customXml" ds:itemID="{BE4DBC62-83C7-4C26-A85C-6023E4D35A02}">
   <ds:schemaRefs>
     <ds:schemaRef ds:uri="http://schemas.microsoft.com/office/2006/metadata/contentType"/>
@@ -22940,27 +22954,7 @@
 </ds:datastoreItem>
 </file>
 
-<file path=customXml/itemProps2.xml><?xml version="1.0" encoding="utf-8"?>
-<ds:datastoreItem xmlns:ds="http://schemas.openxmlformats.org/officeDocument/2006/customXml" ds:itemID="{F3EB3076-2C4C-48B3-A0FA-C6CCF3215BD6}">
-  <ds:schemaRefs/>
-</ds:datastoreItem>
-</file>
-
-<file path=customXml/itemProps3.xml><?xml version="1.0" encoding="utf-8"?>
-<ds:datastoreItem xmlns:ds="http://schemas.openxmlformats.org/officeDocument/2006/customXml" ds:itemID="{08A7BF88-E750-4836-81D0-A8F6064491C0}">
-  <ds:schemaRefs/>
-</ds:datastoreItem>
-</file>
-
 <file path=customXml/itemProps4.xml><?xml version="1.0" encoding="utf-8"?>
-<ds:datastoreItem xmlns:ds="http://schemas.openxmlformats.org/officeDocument/2006/customXml" ds:itemID="{7F29137C-F1C0-4930-80A0-A7C0C38F3D82}">
-  <ds:schemaRefs>
-    <ds:schemaRef ds:uri="http://schemas.microsoft.com/sharepoint/v3/contenttype/forms"/>
-  </ds:schemaRefs>
-</ds:datastoreItem>
-</file>
-
-<file path=customXml/itemProps5.xml><?xml version="1.0" encoding="utf-8"?>
 <ds:datastoreItem xmlns:ds="http://schemas.openxmlformats.org/officeDocument/2006/customXml" ds:itemID="{05F4B324-A6F8-4FC0-BBBB-05E2337781BA}">
   <ds:schemaRefs>
     <ds:schemaRef ds:uri="http://purl.org/dc/dcmitype/"/>
@@ -22975,4 +22969,12 @@
     <ds:schemaRef ds:uri="http://www.w3.org/XML/1998/namespace"/>
   </ds:schemaRefs>
 </ds:datastoreItem>
+</file>
+
+<file path=customXml/itemProps5.xml><?xml version="1.0" encoding="utf-8"?>
+<ds:datastoreItem xmlns:ds="http://schemas.openxmlformats.org/officeDocument/2006/customXml" ds:itemID="{7F29137C-F1C0-4930-80A0-A7C0C38F3D82}">
+  <ds:schemaRefs>
+    <ds:schemaRef ds:uri="http://schemas.microsoft.com/sharepoint/v3/contenttype/forms"/>
+  </ds:schemaRefs>
+</ds:datastoreItem>
 </file>
</xml_diff>